<commit_message>
v 0.2 of Annotation Design document
Steve's rewrite of annotation design and example
</commit_message>
<xml_diff>
--- a/Design/Annotation/AnnotationPictures.pptx
+++ b/Design/Annotation/AnnotationPictures.pptx
@@ -105,6 +105,22 @@
       </a:defRPr>
     </a:lvl9pPr>
   </p:defaultTextStyle>
+  <p:extLst>
+    <p:ext uri="{EFAFB233-063F-42B5-8137-9DF3F51BA10A}">
+      <p15:sldGuideLst xmlns:p15="http://schemas.microsoft.com/office/powerpoint/2012/main">
+        <p15:guide id="1" orient="horz" pos="2160">
+          <p15:clr>
+            <a:srgbClr val="A4A3A4"/>
+          </p15:clr>
+        </p15:guide>
+        <p15:guide id="2" pos="2880">
+          <p15:clr>
+            <a:srgbClr val="A4A3A4"/>
+          </p15:clr>
+        </p15:guide>
+      </p15:sldGuideLst>
+    </p:ext>
+  </p:extLst>
 </p:presentation>
 </file>
 
@@ -289,7 +305,7 @@
           <a:p>
             <a:fld id="{3F6DE654-41F2-4137-AA12-8023740195D5}" type="datetimeFigureOut">
               <a:rPr lang="en-US" smtClean="0"/>
-              <a:t>5/26/2014</a:t>
+              <a:t>6/3/2014</a:t>
             </a:fld>
             <a:endParaRPr lang="en-US"/>
           </a:p>
@@ -459,7 +475,7 @@
           <a:p>
             <a:fld id="{3F6DE654-41F2-4137-AA12-8023740195D5}" type="datetimeFigureOut">
               <a:rPr lang="en-US" smtClean="0"/>
-              <a:t>5/26/2014</a:t>
+              <a:t>6/3/2014</a:t>
             </a:fld>
             <a:endParaRPr lang="en-US"/>
           </a:p>
@@ -639,7 +655,7 @@
           <a:p>
             <a:fld id="{3F6DE654-41F2-4137-AA12-8023740195D5}" type="datetimeFigureOut">
               <a:rPr lang="en-US" smtClean="0"/>
-              <a:t>5/26/2014</a:t>
+              <a:t>6/3/2014</a:t>
             </a:fld>
             <a:endParaRPr lang="en-US"/>
           </a:p>
@@ -809,7 +825,7 @@
           <a:p>
             <a:fld id="{3F6DE654-41F2-4137-AA12-8023740195D5}" type="datetimeFigureOut">
               <a:rPr lang="en-US" smtClean="0"/>
-              <a:t>5/26/2014</a:t>
+              <a:t>6/3/2014</a:t>
             </a:fld>
             <a:endParaRPr lang="en-US"/>
           </a:p>
@@ -1055,7 +1071,7 @@
           <a:p>
             <a:fld id="{3F6DE654-41F2-4137-AA12-8023740195D5}" type="datetimeFigureOut">
               <a:rPr lang="en-US" smtClean="0"/>
-              <a:t>5/26/2014</a:t>
+              <a:t>6/3/2014</a:t>
             </a:fld>
             <a:endParaRPr lang="en-US"/>
           </a:p>
@@ -1343,7 +1359,7 @@
           <a:p>
             <a:fld id="{3F6DE654-41F2-4137-AA12-8023740195D5}" type="datetimeFigureOut">
               <a:rPr lang="en-US" smtClean="0"/>
-              <a:t>5/26/2014</a:t>
+              <a:t>6/3/2014</a:t>
             </a:fld>
             <a:endParaRPr lang="en-US"/>
           </a:p>
@@ -1765,7 +1781,7 @@
           <a:p>
             <a:fld id="{3F6DE654-41F2-4137-AA12-8023740195D5}" type="datetimeFigureOut">
               <a:rPr lang="en-US" smtClean="0"/>
-              <a:t>5/26/2014</a:t>
+              <a:t>6/3/2014</a:t>
             </a:fld>
             <a:endParaRPr lang="en-US"/>
           </a:p>
@@ -1883,7 +1899,7 @@
           <a:p>
             <a:fld id="{3F6DE654-41F2-4137-AA12-8023740195D5}" type="datetimeFigureOut">
               <a:rPr lang="en-US" smtClean="0"/>
-              <a:t>5/26/2014</a:t>
+              <a:t>6/3/2014</a:t>
             </a:fld>
             <a:endParaRPr lang="en-US"/>
           </a:p>
@@ -1978,7 +1994,7 @@
           <a:p>
             <a:fld id="{3F6DE654-41F2-4137-AA12-8023740195D5}" type="datetimeFigureOut">
               <a:rPr lang="en-US" smtClean="0"/>
-              <a:t>5/26/2014</a:t>
+              <a:t>6/3/2014</a:t>
             </a:fld>
             <a:endParaRPr lang="en-US"/>
           </a:p>
@@ -2255,7 +2271,7 @@
           <a:p>
             <a:fld id="{3F6DE654-41F2-4137-AA12-8023740195D5}" type="datetimeFigureOut">
               <a:rPr lang="en-US" smtClean="0"/>
-              <a:t>5/26/2014</a:t>
+              <a:t>6/3/2014</a:t>
             </a:fld>
             <a:endParaRPr lang="en-US"/>
           </a:p>
@@ -2508,7 +2524,7 @@
           <a:p>
             <a:fld id="{3F6DE654-41F2-4137-AA12-8023740195D5}" type="datetimeFigureOut">
               <a:rPr lang="en-US" smtClean="0"/>
-              <a:t>5/26/2014</a:t>
+              <a:t>6/3/2014</a:t>
             </a:fld>
             <a:endParaRPr lang="en-US"/>
           </a:p>
@@ -2721,7 +2737,7 @@
           <a:p>
             <a:fld id="{3F6DE654-41F2-4137-AA12-8023740195D5}" type="datetimeFigureOut">
               <a:rPr lang="en-US" smtClean="0"/>
-              <a:t>5/26/2014</a:t>
+              <a:t>6/3/2014</a:t>
             </a:fld>
             <a:endParaRPr lang="en-US"/>
           </a:p>
@@ -3183,349 +3199,368 @@
           </a:p>
         </p:txBody>
       </p:sp>
-      <p:sp>
-        <p:nvSpPr>
-          <p:cNvPr id="5" name="Flowchart: Multidocument 4"/>
-          <p:cNvSpPr/>
+      <p:grpSp>
+        <p:nvGrpSpPr>
+          <p:cNvPr id="2" name="Group 1"/>
+          <p:cNvGrpSpPr/>
           <p:nvPr/>
-        </p:nvSpPr>
-        <p:spPr>
+        </p:nvGrpSpPr>
+        <p:grpSpPr>
           <a:xfrm>
-            <a:off x="506627" y="2804984"/>
-            <a:ext cx="1507524" cy="1309816"/>
+            <a:off x="506627" y="2790562"/>
+            <a:ext cx="7727091" cy="3004758"/>
+            <a:chOff x="506627" y="2790562"/>
+            <a:chExt cx="7727091" cy="3004758"/>
           </a:xfrm>
-          <a:prstGeom prst="flowChartMultidocument">
-            <a:avLst/>
-          </a:prstGeom>
-        </p:spPr>
-        <p:style>
-          <a:lnRef idx="2">
-            <a:schemeClr val="accent1">
-              <a:shade val="50000"/>
-            </a:schemeClr>
-          </a:lnRef>
-          <a:fillRef idx="1">
-            <a:schemeClr val="accent1"/>
-          </a:fillRef>
-          <a:effectRef idx="0">
-            <a:schemeClr val="accent1"/>
-          </a:effectRef>
-          <a:fontRef idx="minor">
-            <a:schemeClr val="lt1"/>
-          </a:fontRef>
-        </p:style>
-        <p:txBody>
-          <a:bodyPr rtlCol="0" anchor="ctr"/>
-          <a:lstStyle/>
-          <a:p>
-            <a:pPr algn="ctr"/>
-            <a:r>
-              <a:rPr lang="en-US" dirty="0" smtClean="0"/>
-              <a:t>NIEM-UML Model</a:t>
-            </a:r>
-            <a:endParaRPr lang="en-US" dirty="0"/>
-          </a:p>
-        </p:txBody>
-      </p:sp>
-      <p:sp>
-        <p:nvSpPr>
-          <p:cNvPr id="6" name="Flowchart: Multidocument 5"/>
-          <p:cNvSpPr/>
-          <p:nvPr/>
-        </p:nvSpPr>
-        <p:spPr>
-          <a:xfrm>
-            <a:off x="3657600" y="2804984"/>
-            <a:ext cx="1507524" cy="1124465"/>
-          </a:xfrm>
-          <a:prstGeom prst="flowChartMultidocument">
-            <a:avLst/>
-          </a:prstGeom>
-        </p:spPr>
-        <p:style>
-          <a:lnRef idx="2">
-            <a:schemeClr val="accent1">
-              <a:shade val="50000"/>
-            </a:schemeClr>
-          </a:lnRef>
-          <a:fillRef idx="1">
-            <a:schemeClr val="accent1"/>
-          </a:fillRef>
-          <a:effectRef idx="0">
-            <a:schemeClr val="accent1"/>
-          </a:effectRef>
-          <a:fontRef idx="minor">
-            <a:schemeClr val="lt1"/>
-          </a:fontRef>
-        </p:style>
-        <p:txBody>
-          <a:bodyPr rtlCol="0" anchor="ctr"/>
-          <a:lstStyle/>
-          <a:p>
-            <a:pPr algn="ctr"/>
-            <a:r>
-              <a:rPr lang="en-US" dirty="0" smtClean="0"/>
-              <a:t>Annotated Skeleton SSP</a:t>
-            </a:r>
-            <a:endParaRPr lang="en-US" dirty="0"/>
-          </a:p>
-        </p:txBody>
-      </p:sp>
-      <p:sp>
-        <p:nvSpPr>
-          <p:cNvPr id="7" name="Flowchart: Multidocument 6"/>
-          <p:cNvSpPr/>
-          <p:nvPr/>
-        </p:nvSpPr>
-        <p:spPr>
-          <a:xfrm>
-            <a:off x="6726194" y="2804982"/>
-            <a:ext cx="1507524" cy="1124465"/>
-          </a:xfrm>
-          <a:prstGeom prst="flowChartMultidocument">
-            <a:avLst/>
-          </a:prstGeom>
-        </p:spPr>
-        <p:style>
-          <a:lnRef idx="2">
-            <a:schemeClr val="accent1">
-              <a:shade val="50000"/>
-            </a:schemeClr>
-          </a:lnRef>
-          <a:fillRef idx="1">
-            <a:schemeClr val="accent1"/>
-          </a:fillRef>
-          <a:effectRef idx="0">
-            <a:schemeClr val="accent1"/>
-          </a:effectRef>
-          <a:fontRef idx="minor">
-            <a:schemeClr val="lt1"/>
-          </a:fontRef>
-        </p:style>
-        <p:txBody>
-          <a:bodyPr rtlCol="0" anchor="ctr"/>
-          <a:lstStyle/>
-          <a:p>
-            <a:pPr algn="ctr"/>
-            <a:r>
-              <a:rPr lang="en-US" dirty="0" smtClean="0"/>
-              <a:t>Final SSP</a:t>
-            </a:r>
-            <a:endParaRPr lang="en-US" dirty="0"/>
-          </a:p>
-        </p:txBody>
-      </p:sp>
-      <p:sp>
-        <p:nvSpPr>
-          <p:cNvPr id="8" name="Flowchart: Document 7"/>
-          <p:cNvSpPr/>
-          <p:nvPr/>
-        </p:nvSpPr>
-        <p:spPr>
-          <a:xfrm>
-            <a:off x="3355062" y="4819136"/>
-            <a:ext cx="1902941" cy="976184"/>
-          </a:xfrm>
-          <a:prstGeom prst="flowChartDocument">
-            <a:avLst/>
-          </a:prstGeom>
-        </p:spPr>
-        <p:style>
-          <a:lnRef idx="2">
-            <a:schemeClr val="accent1">
-              <a:shade val="50000"/>
-            </a:schemeClr>
-          </a:lnRef>
-          <a:fillRef idx="1">
-            <a:schemeClr val="accent1"/>
-          </a:fillRef>
-          <a:effectRef idx="0">
-            <a:schemeClr val="accent1"/>
-          </a:effectRef>
-          <a:fontRef idx="minor">
-            <a:schemeClr val="lt1"/>
-          </a:fontRef>
-        </p:style>
-        <p:txBody>
-          <a:bodyPr rtlCol="0" anchor="ctr"/>
-          <a:lstStyle/>
-          <a:p>
-            <a:pPr algn="ctr"/>
-            <a:r>
-              <a:rPr lang="en-US" dirty="0" smtClean="0"/>
-              <a:t>Transformation Template</a:t>
-            </a:r>
-          </a:p>
-          <a:p>
-            <a:pPr algn="ctr"/>
-            <a:r>
-              <a:rPr lang="en-US" dirty="0" smtClean="0"/>
-              <a:t>(XSLT+)</a:t>
-            </a:r>
-            <a:endParaRPr lang="en-US" dirty="0"/>
-          </a:p>
-        </p:txBody>
-      </p:sp>
-      <p:sp>
-        <p:nvSpPr>
-          <p:cNvPr id="9" name="Right Arrow 8"/>
-          <p:cNvSpPr/>
-          <p:nvPr/>
-        </p:nvSpPr>
-        <p:spPr>
-          <a:xfrm>
-            <a:off x="2014151" y="2872944"/>
-            <a:ext cx="1643449" cy="988539"/>
-          </a:xfrm>
-          <a:prstGeom prst="rightArrow">
-            <a:avLst/>
-          </a:prstGeom>
-          <a:solidFill>
-            <a:srgbClr val="C00000"/>
-          </a:solidFill>
-        </p:spPr>
-        <p:style>
-          <a:lnRef idx="2">
-            <a:schemeClr val="accent1">
-              <a:shade val="50000"/>
-            </a:schemeClr>
-          </a:lnRef>
-          <a:fillRef idx="1">
-            <a:schemeClr val="accent1"/>
-          </a:fillRef>
-          <a:effectRef idx="0">
-            <a:schemeClr val="accent1"/>
-          </a:effectRef>
-          <a:fontRef idx="minor">
-            <a:schemeClr val="lt1"/>
-          </a:fontRef>
-        </p:style>
-        <p:txBody>
-          <a:bodyPr rtlCol="0" anchor="ctr"/>
-          <a:lstStyle/>
-          <a:p>
-            <a:pPr algn="ctr"/>
-            <a:r>
-              <a:rPr lang="en-US" dirty="0" smtClean="0"/>
-              <a:t>QVT Pre-Provisioning</a:t>
-            </a:r>
-            <a:endParaRPr lang="en-US" dirty="0"/>
-          </a:p>
-        </p:txBody>
-      </p:sp>
-      <p:sp>
-        <p:nvSpPr>
-          <p:cNvPr id="10" name="Right Arrow 9"/>
-          <p:cNvSpPr/>
-          <p:nvPr/>
-        </p:nvSpPr>
-        <p:spPr>
-          <a:xfrm>
-            <a:off x="5165124" y="2790562"/>
-            <a:ext cx="1643449" cy="988539"/>
-          </a:xfrm>
-          <a:prstGeom prst="rightArrow">
-            <a:avLst/>
-          </a:prstGeom>
-          <a:solidFill>
-            <a:srgbClr val="C00000"/>
-          </a:solidFill>
-        </p:spPr>
-        <p:style>
-          <a:lnRef idx="2">
-            <a:schemeClr val="accent1">
-              <a:shade val="50000"/>
-            </a:schemeClr>
-          </a:lnRef>
-          <a:fillRef idx="1">
-            <a:schemeClr val="accent1"/>
-          </a:fillRef>
-          <a:effectRef idx="0">
-            <a:schemeClr val="accent1"/>
-          </a:effectRef>
-          <a:fontRef idx="minor">
-            <a:schemeClr val="lt1"/>
-          </a:fontRef>
-        </p:style>
-        <p:txBody>
-          <a:bodyPr rtlCol="0" anchor="ctr"/>
-          <a:lstStyle/>
-          <a:p>
-            <a:pPr algn="ctr"/>
-            <a:r>
-              <a:rPr lang="en-US" dirty="0" smtClean="0"/>
-              <a:t>XSLT Prost-Provisioning</a:t>
-            </a:r>
-            <a:endParaRPr lang="en-US" dirty="0"/>
-          </a:p>
-        </p:txBody>
-      </p:sp>
-      <p:cxnSp>
-        <p:nvCxnSpPr>
-          <p:cNvPr id="12" name="Straight Arrow Connector 11"/>
-          <p:cNvCxnSpPr>
-            <a:stCxn id="6" idx="2"/>
-            <a:endCxn id="8" idx="0"/>
-          </p:cNvCxnSpPr>
-          <p:nvPr/>
-        </p:nvCxnSpPr>
-        <p:spPr>
-          <a:xfrm>
-            <a:off x="4306533" y="3886865"/>
-            <a:ext cx="0" cy="932271"/>
-          </a:xfrm>
-          <a:prstGeom prst="straightConnector1">
-            <a:avLst/>
-          </a:prstGeom>
-          <a:ln>
-            <a:tailEnd type="arrow"/>
-          </a:ln>
-        </p:spPr>
-        <p:style>
-          <a:lnRef idx="1">
-            <a:schemeClr val="accent1"/>
-          </a:lnRef>
-          <a:fillRef idx="0">
-            <a:schemeClr val="accent1"/>
-          </a:fillRef>
-          <a:effectRef idx="0">
-            <a:schemeClr val="accent1"/>
-          </a:effectRef>
-          <a:fontRef idx="minor">
-            <a:schemeClr val="tx1"/>
-          </a:fontRef>
-        </p:style>
-      </p:cxnSp>
-      <p:sp>
-        <p:nvSpPr>
-          <p:cNvPr id="14" name="TextBox 13"/>
-          <p:cNvSpPr txBox="1"/>
-          <p:nvPr/>
-        </p:nvSpPr>
-        <p:spPr>
-          <a:xfrm>
-            <a:off x="4411362" y="4448433"/>
-            <a:ext cx="1216551" cy="369332"/>
-          </a:xfrm>
-          <a:prstGeom prst="rect">
-            <a:avLst/>
-          </a:prstGeom>
-          <a:noFill/>
-        </p:spPr>
-        <p:txBody>
-          <a:bodyPr wrap="none" rtlCol="0">
-            <a:spAutoFit/>
-          </a:bodyPr>
-          <a:lstStyle/>
-          <a:p>
-            <a:r>
-              <a:rPr lang="en-US" dirty="0" smtClean="0"/>
-              <a:t>References</a:t>
-            </a:r>
-            <a:endParaRPr lang="en-US" dirty="0"/>
-          </a:p>
-        </p:txBody>
-      </p:sp>
+        </p:grpSpPr>
+        <p:sp>
+          <p:nvSpPr>
+            <p:cNvPr id="5" name="Flowchart: Multidocument 4"/>
+            <p:cNvSpPr/>
+            <p:nvPr/>
+          </p:nvSpPr>
+          <p:spPr>
+            <a:xfrm>
+              <a:off x="506627" y="2804984"/>
+              <a:ext cx="1507524" cy="1309816"/>
+            </a:xfrm>
+            <a:prstGeom prst="flowChartMultidocument">
+              <a:avLst/>
+            </a:prstGeom>
+          </p:spPr>
+          <p:style>
+            <a:lnRef idx="2">
+              <a:schemeClr val="accent1">
+                <a:shade val="50000"/>
+              </a:schemeClr>
+            </a:lnRef>
+            <a:fillRef idx="1">
+              <a:schemeClr val="accent1"/>
+            </a:fillRef>
+            <a:effectRef idx="0">
+              <a:schemeClr val="accent1"/>
+            </a:effectRef>
+            <a:fontRef idx="minor">
+              <a:schemeClr val="lt1"/>
+            </a:fontRef>
+          </p:style>
+          <p:txBody>
+            <a:bodyPr rtlCol="0" anchor="ctr"/>
+            <a:lstStyle/>
+            <a:p>
+              <a:pPr algn="ctr"/>
+              <a:r>
+                <a:rPr lang="en-US" dirty="0" smtClean="0"/>
+                <a:t>GRA-UML Model</a:t>
+              </a:r>
+              <a:endParaRPr lang="en-US" dirty="0"/>
+            </a:p>
+          </p:txBody>
+        </p:sp>
+        <p:sp>
+          <p:nvSpPr>
+            <p:cNvPr id="6" name="Flowchart: Multidocument 5"/>
+            <p:cNvSpPr/>
+            <p:nvPr/>
+          </p:nvSpPr>
+          <p:spPr>
+            <a:xfrm>
+              <a:off x="3657600" y="2804984"/>
+              <a:ext cx="1507524" cy="1124465"/>
+            </a:xfrm>
+            <a:prstGeom prst="flowChartMultidocument">
+              <a:avLst/>
+            </a:prstGeom>
+          </p:spPr>
+          <p:style>
+            <a:lnRef idx="2">
+              <a:schemeClr val="accent1">
+                <a:shade val="50000"/>
+              </a:schemeClr>
+            </a:lnRef>
+            <a:fillRef idx="1">
+              <a:schemeClr val="accent1"/>
+            </a:fillRef>
+            <a:effectRef idx="0">
+              <a:schemeClr val="accent1"/>
+            </a:effectRef>
+            <a:fontRef idx="minor">
+              <a:schemeClr val="lt1"/>
+            </a:fontRef>
+          </p:style>
+          <p:txBody>
+            <a:bodyPr rtlCol="0" anchor="ctr"/>
+            <a:lstStyle/>
+            <a:p>
+              <a:pPr algn="ctr"/>
+              <a:r>
+                <a:rPr lang="en-US" dirty="0" smtClean="0"/>
+                <a:t>Annotated Skeleton SSP</a:t>
+              </a:r>
+              <a:endParaRPr lang="en-US" dirty="0"/>
+            </a:p>
+          </p:txBody>
+        </p:sp>
+        <p:sp>
+          <p:nvSpPr>
+            <p:cNvPr id="7" name="Flowchart: Multidocument 6"/>
+            <p:cNvSpPr/>
+            <p:nvPr/>
+          </p:nvSpPr>
+          <p:spPr>
+            <a:xfrm>
+              <a:off x="6726194" y="2804982"/>
+              <a:ext cx="1507524" cy="1124465"/>
+            </a:xfrm>
+            <a:prstGeom prst="flowChartMultidocument">
+              <a:avLst/>
+            </a:prstGeom>
+          </p:spPr>
+          <p:style>
+            <a:lnRef idx="2">
+              <a:schemeClr val="accent1">
+                <a:shade val="50000"/>
+              </a:schemeClr>
+            </a:lnRef>
+            <a:fillRef idx="1">
+              <a:schemeClr val="accent1"/>
+            </a:fillRef>
+            <a:effectRef idx="0">
+              <a:schemeClr val="accent1"/>
+            </a:effectRef>
+            <a:fontRef idx="minor">
+              <a:schemeClr val="lt1"/>
+            </a:fontRef>
+          </p:style>
+          <p:txBody>
+            <a:bodyPr rtlCol="0" anchor="ctr"/>
+            <a:lstStyle/>
+            <a:p>
+              <a:pPr algn="ctr"/>
+              <a:r>
+                <a:rPr lang="en-US" dirty="0" smtClean="0"/>
+                <a:t>Final SSP</a:t>
+              </a:r>
+              <a:endParaRPr lang="en-US" dirty="0"/>
+            </a:p>
+          </p:txBody>
+        </p:sp>
+        <p:sp>
+          <p:nvSpPr>
+            <p:cNvPr id="8" name="Flowchart: Document 7"/>
+            <p:cNvSpPr/>
+            <p:nvPr/>
+          </p:nvSpPr>
+          <p:spPr>
+            <a:xfrm>
+              <a:off x="3355062" y="4819136"/>
+              <a:ext cx="1902941" cy="976184"/>
+            </a:xfrm>
+            <a:prstGeom prst="flowChartDocument">
+              <a:avLst/>
+            </a:prstGeom>
+          </p:spPr>
+          <p:style>
+            <a:lnRef idx="2">
+              <a:schemeClr val="accent1">
+                <a:shade val="50000"/>
+              </a:schemeClr>
+            </a:lnRef>
+            <a:fillRef idx="1">
+              <a:schemeClr val="accent1"/>
+            </a:fillRef>
+            <a:effectRef idx="0">
+              <a:schemeClr val="accent1"/>
+            </a:effectRef>
+            <a:fontRef idx="minor">
+              <a:schemeClr val="lt1"/>
+            </a:fontRef>
+          </p:style>
+          <p:txBody>
+            <a:bodyPr rtlCol="0" anchor="ctr"/>
+            <a:lstStyle/>
+            <a:p>
+              <a:pPr algn="ctr"/>
+              <a:r>
+                <a:rPr lang="en-US" dirty="0" smtClean="0"/>
+                <a:t>Transformation Template</a:t>
+              </a:r>
+            </a:p>
+            <a:p>
+              <a:pPr algn="ctr"/>
+              <a:r>
+                <a:rPr lang="en-US" dirty="0" smtClean="0"/>
+                <a:t>(XSLT+)</a:t>
+              </a:r>
+              <a:endParaRPr lang="en-US" dirty="0"/>
+            </a:p>
+          </p:txBody>
+        </p:sp>
+        <p:sp>
+          <p:nvSpPr>
+            <p:cNvPr id="9" name="Right Arrow 8"/>
+            <p:cNvSpPr/>
+            <p:nvPr/>
+          </p:nvSpPr>
+          <p:spPr>
+            <a:xfrm>
+              <a:off x="2014151" y="2872944"/>
+              <a:ext cx="1643449" cy="988539"/>
+            </a:xfrm>
+            <a:prstGeom prst="rightArrow">
+              <a:avLst/>
+            </a:prstGeom>
+            <a:solidFill>
+              <a:srgbClr val="C00000"/>
+            </a:solidFill>
+          </p:spPr>
+          <p:style>
+            <a:lnRef idx="2">
+              <a:schemeClr val="accent1">
+                <a:shade val="50000"/>
+              </a:schemeClr>
+            </a:lnRef>
+            <a:fillRef idx="1">
+              <a:schemeClr val="accent1"/>
+            </a:fillRef>
+            <a:effectRef idx="0">
+              <a:schemeClr val="accent1"/>
+            </a:effectRef>
+            <a:fontRef idx="minor">
+              <a:schemeClr val="lt1"/>
+            </a:fontRef>
+          </p:style>
+          <p:txBody>
+            <a:bodyPr rtlCol="0" anchor="ctr"/>
+            <a:lstStyle/>
+            <a:p>
+              <a:pPr algn="ctr"/>
+              <a:r>
+                <a:rPr lang="en-US" dirty="0" smtClean="0"/>
+                <a:t>QVT Pre-Provisioning</a:t>
+              </a:r>
+              <a:endParaRPr lang="en-US" dirty="0"/>
+            </a:p>
+          </p:txBody>
+        </p:sp>
+        <p:sp>
+          <p:nvSpPr>
+            <p:cNvPr id="10" name="Right Arrow 9"/>
+            <p:cNvSpPr/>
+            <p:nvPr/>
+          </p:nvSpPr>
+          <p:spPr>
+            <a:xfrm>
+              <a:off x="5165124" y="2790562"/>
+              <a:ext cx="1643449" cy="988539"/>
+            </a:xfrm>
+            <a:prstGeom prst="rightArrow">
+              <a:avLst/>
+            </a:prstGeom>
+            <a:solidFill>
+              <a:srgbClr val="C00000"/>
+            </a:solidFill>
+          </p:spPr>
+          <p:style>
+            <a:lnRef idx="2">
+              <a:schemeClr val="accent1">
+                <a:shade val="50000"/>
+              </a:schemeClr>
+            </a:lnRef>
+            <a:fillRef idx="1">
+              <a:schemeClr val="accent1"/>
+            </a:fillRef>
+            <a:effectRef idx="0">
+              <a:schemeClr val="accent1"/>
+            </a:effectRef>
+            <a:fontRef idx="minor">
+              <a:schemeClr val="lt1"/>
+            </a:fontRef>
+          </p:style>
+          <p:txBody>
+            <a:bodyPr rtlCol="0" anchor="ctr"/>
+            <a:lstStyle/>
+            <a:p>
+              <a:pPr algn="ctr"/>
+              <a:r>
+                <a:rPr lang="en-US" dirty="0" smtClean="0"/>
+                <a:t>XSLT </a:t>
+              </a:r>
+              <a:r>
+                <a:rPr lang="en-US" dirty="0" smtClean="0"/>
+                <a:t>Post-Provisioning</a:t>
+              </a:r>
+              <a:endParaRPr lang="en-US" dirty="0"/>
+            </a:p>
+          </p:txBody>
+        </p:sp>
+        <p:cxnSp>
+          <p:nvCxnSpPr>
+            <p:cNvPr id="12" name="Straight Arrow Connector 11"/>
+            <p:cNvCxnSpPr>
+              <a:stCxn id="6" idx="2"/>
+              <a:endCxn id="8" idx="0"/>
+            </p:cNvCxnSpPr>
+            <p:nvPr/>
+          </p:nvCxnSpPr>
+          <p:spPr>
+            <a:xfrm>
+              <a:off x="4306533" y="3886865"/>
+              <a:ext cx="0" cy="932271"/>
+            </a:xfrm>
+            <a:prstGeom prst="straightConnector1">
+              <a:avLst/>
+            </a:prstGeom>
+            <a:ln>
+              <a:tailEnd type="arrow"/>
+            </a:ln>
+          </p:spPr>
+          <p:style>
+            <a:lnRef idx="1">
+              <a:schemeClr val="accent1"/>
+            </a:lnRef>
+            <a:fillRef idx="0">
+              <a:schemeClr val="accent1"/>
+            </a:fillRef>
+            <a:effectRef idx="0">
+              <a:schemeClr val="accent1"/>
+            </a:effectRef>
+            <a:fontRef idx="minor">
+              <a:schemeClr val="tx1"/>
+            </a:fontRef>
+          </p:style>
+        </p:cxnSp>
+        <p:sp>
+          <p:nvSpPr>
+            <p:cNvPr id="14" name="TextBox 13"/>
+            <p:cNvSpPr txBox="1"/>
+            <p:nvPr/>
+          </p:nvSpPr>
+          <p:spPr>
+            <a:xfrm>
+              <a:off x="4411362" y="4448433"/>
+              <a:ext cx="1216551" cy="369331"/>
+            </a:xfrm>
+            <a:prstGeom prst="rect">
+              <a:avLst/>
+            </a:prstGeom>
+            <a:noFill/>
+          </p:spPr>
+          <p:txBody>
+            <a:bodyPr wrap="none" rtlCol="0">
+              <a:spAutoFit/>
+            </a:bodyPr>
+            <a:lstStyle/>
+            <a:p>
+              <a:r>
+                <a:rPr lang="en-US" dirty="0" smtClean="0"/>
+                <a:t>References</a:t>
+              </a:r>
+              <a:endParaRPr lang="en-US" dirty="0"/>
+            </a:p>
+          </p:txBody>
+        </p:sp>
+      </p:grpSp>
     </p:spTree>
     <p:extLst>
       <p:ext uri="{BB962C8B-B14F-4D97-AF65-F5344CB8AC3E}">

</xml_diff>